<commit_message>
Mais uns pequenos detalhes
</commit_message>
<xml_diff>
--- a/Recursos Adicionais/EzPower™ - Apresentação do Produto.pptx
+++ b/Recursos Adicionais/EzPower™ - Apresentação do Produto.pptx
@@ -14151,14 +14151,49 @@
           <a:lstStyle/>
           <a:p>
             <a:r>
-              <a:rPr lang="pt-PT"/>
+              <a:rPr lang="pt-PT" dirty="0" err="1"/>
               <a:t>EzPower</a:t>
             </a:r>
             <a:r>
-              <a:rPr lang="pt-PT">
+              <a:rPr lang="pt-PT" dirty="0">
                 <a:effectLst/>
               </a:rPr>
-              <a:t>™ by Flexible Energies</a:t>
+              <a:t>™ </a:t>
+            </a:r>
+            <a:br>
+              <a:rPr lang="pt-PT" dirty="0">
+                <a:effectLst/>
+              </a:rPr>
+            </a:br>
+            <a:r>
+              <a:rPr lang="pt-PT" dirty="0" err="1">
+                <a:effectLst/>
+              </a:rPr>
+              <a:t>by</a:t>
+            </a:r>
+            <a:r>
+              <a:rPr lang="pt-PT" dirty="0">
+                <a:effectLst/>
+              </a:rPr>
+              <a:t> </a:t>
+            </a:r>
+            <a:r>
+              <a:rPr lang="pt-PT" dirty="0" err="1">
+                <a:effectLst/>
+              </a:rPr>
+              <a:t>Flexible</a:t>
+            </a:r>
+            <a:r>
+              <a:rPr lang="pt-PT" dirty="0">
+                <a:effectLst/>
+              </a:rPr>
+              <a:t> </a:t>
+            </a:r>
+            <a:r>
+              <a:rPr lang="pt-PT" dirty="0" err="1">
+                <a:effectLst/>
+              </a:rPr>
+              <a:t>Energies</a:t>
             </a:r>
             <a:endParaRPr lang="pt-PT" dirty="0"/>
           </a:p>
@@ -14478,13 +14513,13 @@
   <p:clrMapOvr>
     <a:masterClrMapping/>
   </p:clrMapOvr>
-  <mc:AlternateContent xmlns:mc="http://schemas.openxmlformats.org/markup-compatibility/2006">
-    <mc:Choice xmlns:p14="http://schemas.microsoft.com/office/powerpoint/2010/main" Requires="p14">
+  <mc:AlternateContent xmlns:mc="http://schemas.openxmlformats.org/markup-compatibility/2006" xmlns:p14="http://schemas.microsoft.com/office/powerpoint/2010/main">
+    <mc:Choice Requires="p14">
       <p:transition spd="med" p14:dur="700">
         <p:fade/>
       </p:transition>
     </mc:Choice>
-    <mc:Fallback>
+    <mc:Fallback xmlns="">
       <p:transition spd="med">
         <p:fade/>
       </p:transition>
@@ -14849,7 +14884,7 @@
             </a:r>
             <a:r>
               <a:rPr lang="en-US" dirty="0" err="1"/>
-              <a:t>enrolar</a:t>
+              <a:t>Enrolar</a:t>
             </a:r>
             <a:endParaRPr lang="en-US" dirty="0"/>
           </a:p>
@@ -14920,13 +14955,13 @@
   <p:clrMapOvr>
     <a:masterClrMapping/>
   </p:clrMapOvr>
-  <mc:AlternateContent xmlns:mc="http://schemas.openxmlformats.org/markup-compatibility/2006">
-    <mc:Choice xmlns:p14="http://schemas.microsoft.com/office/powerpoint/2010/main" Requires="p14">
+  <mc:AlternateContent xmlns:mc="http://schemas.openxmlformats.org/markup-compatibility/2006" xmlns:p14="http://schemas.microsoft.com/office/powerpoint/2010/main">
+    <mc:Choice Requires="p14">
       <p:transition spd="med" p14:dur="700">
         <p:fade/>
       </p:transition>
     </mc:Choice>
-    <mc:Fallback>
+    <mc:Fallback xmlns="">
       <p:transition spd="med">
         <p:fade/>
       </p:transition>
@@ -15282,13 +15317,13 @@
   <p:clrMapOvr>
     <a:masterClrMapping/>
   </p:clrMapOvr>
-  <mc:AlternateContent xmlns:mc="http://schemas.openxmlformats.org/markup-compatibility/2006">
-    <mc:Choice xmlns:p14="http://schemas.microsoft.com/office/powerpoint/2010/main" Requires="p14">
+  <mc:AlternateContent xmlns:mc="http://schemas.openxmlformats.org/markup-compatibility/2006" xmlns:p14="http://schemas.microsoft.com/office/powerpoint/2010/main">
+    <mc:Choice Requires="p14">
       <p:transition spd="med" p14:dur="700">
         <p:fade/>
       </p:transition>
     </mc:Choice>
-    <mc:Fallback>
+    <mc:Fallback xmlns="">
       <p:transition spd="med">
         <p:fade/>
       </p:transition>
@@ -15644,13 +15679,13 @@
   <p:clrMapOvr>
     <a:masterClrMapping/>
   </p:clrMapOvr>
-  <mc:AlternateContent xmlns:mc="http://schemas.openxmlformats.org/markup-compatibility/2006">
-    <mc:Choice xmlns:p14="http://schemas.microsoft.com/office/powerpoint/2010/main" Requires="p14">
+  <mc:AlternateContent xmlns:mc="http://schemas.openxmlformats.org/markup-compatibility/2006" xmlns:p14="http://schemas.microsoft.com/office/powerpoint/2010/main">
+    <mc:Choice Requires="p14">
       <p:transition spd="med" p14:dur="700">
         <p:fade/>
       </p:transition>
     </mc:Choice>
-    <mc:Fallback>
+    <mc:Fallback xmlns="">
       <p:transition spd="med">
         <p:fade/>
       </p:transition>
@@ -16006,13 +16041,13 @@
   <p:clrMapOvr>
     <a:masterClrMapping/>
   </p:clrMapOvr>
-  <mc:AlternateContent xmlns:mc="http://schemas.openxmlformats.org/markup-compatibility/2006">
-    <mc:Choice xmlns:p14="http://schemas.microsoft.com/office/powerpoint/2010/main" Requires="p14">
+  <mc:AlternateContent xmlns:mc="http://schemas.openxmlformats.org/markup-compatibility/2006" xmlns:p14="http://schemas.microsoft.com/office/powerpoint/2010/main">
+    <mc:Choice Requires="p14">
       <p:transition spd="med" p14:dur="700">
         <p:fade/>
       </p:transition>
     </mc:Choice>
-    <mc:Fallback>
+    <mc:Fallback xmlns="">
       <p:transition spd="med">
         <p:fade/>
       </p:transition>
@@ -16535,7 +16570,7 @@
       </p:sp>
       <p:pic>
         <p:nvPicPr>
-          <p:cNvPr id="6" name="Graphic 5" descr="Wind Chime">
+          <p:cNvPr id="6" name="Graphic 5" descr="Presentation with checklist with solid fill">
             <a:extLst>
               <a:ext uri="{FF2B5EF4-FFF2-40B4-BE49-F238E27FC236}">
                 <a16:creationId xmlns:a16="http://schemas.microsoft.com/office/drawing/2014/main" id="{61214C14-7142-612C-150D-C6FF3798AED4}"/>
@@ -16550,17 +16585,13 @@
         <p:blipFill>
           <a:blip r:embed="rId2">
             <a:extLst>
-              <a:ext uri="{28A0092B-C50C-407E-A947-70E740481C1C}">
-                <a14:useLocalDpi xmlns:a14="http://schemas.microsoft.com/office/drawing/2010/main" val="0"/>
-              </a:ext>
               <a:ext uri="{96DAC541-7B7A-43D3-8B79-37D633B846F1}">
                 <asvg:svgBlip xmlns:asvg="http://schemas.microsoft.com/office/drawing/2016/SVG/main" r:embed="rId3"/>
               </a:ext>
             </a:extLst>
           </a:blip>
-          <a:stretch>
-            <a:fillRect/>
-          </a:stretch>
+          <a:srcRect/>
+          <a:stretch/>
         </p:blipFill>
         <p:spPr>
           <a:xfrm>
@@ -16582,13 +16613,13 @@
   <p:clrMapOvr>
     <a:masterClrMapping/>
   </p:clrMapOvr>
-  <mc:AlternateContent xmlns:mc="http://schemas.openxmlformats.org/markup-compatibility/2006">
-    <mc:Choice xmlns:p14="http://schemas.microsoft.com/office/powerpoint/2010/main" Requires="p14">
+  <mc:AlternateContent xmlns:mc="http://schemas.openxmlformats.org/markup-compatibility/2006" xmlns:p14="http://schemas.microsoft.com/office/powerpoint/2010/main">
+    <mc:Choice Requires="p14">
       <p:transition spd="med" p14:dur="700">
         <p:fade/>
       </p:transition>
     </mc:Choice>
-    <mc:Fallback>
+    <mc:Fallback xmlns="">
       <p:transition spd="med">
         <p:fade/>
       </p:transition>

</xml_diff>